<commit_message>
initial version of the ARM article
</commit_message>
<xml_diff>
--- a/assets/images/2016/cmsis-plus-rtos-overview.pptx
+++ b/assets/images/2016/cmsis-plus-rtos-overview.pptx
@@ -1898,7 +1898,7 @@
         <p:spPr>
           <a:xfrm>
             <a:off x="6724518" y="889000"/>
-            <a:ext cx="5334005" cy="3771900"/>
+            <a:ext cx="5334006" cy="3771900"/>
           </a:xfrm>
           <a:prstGeom prst="rect">
             <a:avLst/>
@@ -2984,7 +2984,7 @@
         <p:spPr>
           <a:xfrm rot="1">
             <a:off x="927002" y="5202356"/>
-            <a:ext cx="11150797" cy="76202"/>
+            <a:ext cx="11150797" cy="76203"/>
           </a:xfrm>
           <a:prstGeom prst="rect">
             <a:avLst/>
@@ -3012,8 +3012,8 @@
         </p:blipFill>
         <p:spPr>
           <a:xfrm>
-            <a:off x="927002" y="1615857"/>
-            <a:ext cx="11150797" cy="76202"/>
+            <a:off x="927002" y="1615856"/>
+            <a:ext cx="11150797" cy="76203"/>
           </a:xfrm>
           <a:prstGeom prst="rect">
             <a:avLst/>
@@ -3031,10 +3031,10 @@
         </p:nvGrpSpPr>
         <p:grpSpPr>
           <a:xfrm>
-            <a:off x="3337369" y="8854816"/>
-            <a:ext cx="6330064" cy="639768"/>
+            <a:off x="3337369" y="8854815"/>
+            <a:ext cx="6330066" cy="639770"/>
             <a:chOff x="0" y="0"/>
-            <a:chExt cx="6330063" cy="639767"/>
+            <a:chExt cx="6330065" cy="639768"/>
           </a:xfrm>
         </p:grpSpPr>
         <p:sp>
@@ -3045,8 +3045,8 @@
           </p:nvSpPr>
           <p:spPr>
             <a:xfrm>
-              <a:off x="0" y="-1"/>
-              <a:ext cx="6330064" cy="639768"/>
+              <a:off x="-1" y="-1"/>
+              <a:ext cx="6330067" cy="639770"/>
             </a:xfrm>
             <a:prstGeom prst="roundRect">
               <a:avLst>
@@ -3152,10 +3152,10 @@
         </p:nvGrpSpPr>
         <p:grpSpPr>
           <a:xfrm>
-            <a:off x="1373533" y="4170219"/>
-            <a:ext cx="10257737" cy="639768"/>
+            <a:off x="1373532" y="4170218"/>
+            <a:ext cx="10257740" cy="639770"/>
             <a:chOff x="0" y="0"/>
-            <a:chExt cx="10257735" cy="639767"/>
+            <a:chExt cx="10257738" cy="639768"/>
           </a:xfrm>
         </p:grpSpPr>
         <p:sp>
@@ -3166,8 +3166,8 @@
           </p:nvSpPr>
           <p:spPr>
             <a:xfrm>
-              <a:off x="0" y="-1"/>
-              <a:ext cx="10257737" cy="639768"/>
+              <a:off x="-1" y="-1"/>
+              <a:ext cx="10257740" cy="639770"/>
             </a:xfrm>
             <a:prstGeom prst="roundRect">
               <a:avLst>
@@ -3226,7 +3226,7 @@
           <p:spPr>
             <a:xfrm>
               <a:off x="3590615" y="111839"/>
-              <a:ext cx="3022402" cy="406401"/>
+              <a:ext cx="3022403" cy="406401"/>
             </a:xfrm>
             <a:prstGeom prst="rect">
               <a:avLst/>
@@ -3283,8 +3283,8 @@
         </p:blipFill>
         <p:spPr>
           <a:xfrm rot="1">
-            <a:off x="927002" y="8388195"/>
-            <a:ext cx="11150797" cy="76202"/>
+            <a:off x="927002" y="8388194"/>
+            <a:ext cx="11150797" cy="76203"/>
           </a:xfrm>
           <a:prstGeom prst="rect">
             <a:avLst/>
@@ -3302,10 +3302,10 @@
         </p:nvGrpSpPr>
         <p:grpSpPr>
           <a:xfrm>
-            <a:off x="1373532" y="3124904"/>
-            <a:ext cx="5692674" cy="639767"/>
+            <a:off x="1373530" y="3124903"/>
+            <a:ext cx="5692677" cy="639770"/>
             <a:chOff x="0" y="0"/>
-            <a:chExt cx="5692672" cy="639766"/>
+            <a:chExt cx="5692675" cy="639768"/>
           </a:xfrm>
         </p:grpSpPr>
         <p:sp>
@@ -3317,7 +3317,7 @@
           <p:spPr>
             <a:xfrm>
               <a:off x="-1" y="-1"/>
-              <a:ext cx="5692674" cy="639768"/>
+              <a:ext cx="5692676" cy="639769"/>
             </a:xfrm>
             <a:prstGeom prst="roundRect">
               <a:avLst>
@@ -3423,10 +3423,10 @@
         </p:nvGrpSpPr>
         <p:grpSpPr>
           <a:xfrm>
-            <a:off x="4177812" y="2080067"/>
-            <a:ext cx="2888393" cy="639769"/>
-            <a:chOff x="0" y="0"/>
-            <a:chExt cx="2888392" cy="639768"/>
+            <a:off x="4177812" y="2080066"/>
+            <a:ext cx="2888395" cy="639772"/>
+            <a:chOff x="0" y="-1"/>
+            <a:chExt cx="2888394" cy="639771"/>
           </a:xfrm>
         </p:grpSpPr>
         <p:sp>
@@ -3437,8 +3437,8 @@
           </p:nvSpPr>
           <p:spPr>
             <a:xfrm>
-              <a:off x="0" y="-1"/>
-              <a:ext cx="2888392" cy="639770"/>
+              <a:off x="0" y="-2"/>
+              <a:ext cx="2888394" cy="639773"/>
             </a:xfrm>
             <a:prstGeom prst="roundRect">
               <a:avLst>
@@ -3496,8 +3496,8 @@
           </p:nvSpPr>
           <p:spPr>
             <a:xfrm>
-              <a:off x="0" y="116682"/>
-              <a:ext cx="2888393" cy="406401"/>
+              <a:off x="-1" y="116682"/>
+              <a:ext cx="2888396" cy="406401"/>
             </a:xfrm>
             <a:prstGeom prst="rect">
               <a:avLst/>
@@ -3544,10 +3544,10 @@
         </p:nvGrpSpPr>
         <p:grpSpPr>
           <a:xfrm>
-            <a:off x="8484058" y="3124904"/>
-            <a:ext cx="3147212" cy="639767"/>
+            <a:off x="8484058" y="3124903"/>
+            <a:ext cx="3147215" cy="639770"/>
             <a:chOff x="0" y="0"/>
-            <a:chExt cx="3147210" cy="639766"/>
+            <a:chExt cx="3147214" cy="639768"/>
           </a:xfrm>
         </p:grpSpPr>
         <p:sp>
@@ -3558,8 +3558,8 @@
           </p:nvSpPr>
           <p:spPr>
             <a:xfrm>
-              <a:off x="0" y="-1"/>
-              <a:ext cx="3147212" cy="639768"/>
+              <a:off x="-1" y="-1"/>
+              <a:ext cx="3147216" cy="639769"/>
             </a:xfrm>
             <a:prstGeom prst="roundRect">
               <a:avLst>
@@ -3665,10 +3665,10 @@
         </p:nvGrpSpPr>
         <p:grpSpPr>
           <a:xfrm>
-            <a:off x="8484058" y="2080067"/>
-            <a:ext cx="3147212" cy="639769"/>
-            <a:chOff x="0" y="0"/>
-            <a:chExt cx="3147210" cy="639768"/>
+            <a:off x="8484058" y="2080066"/>
+            <a:ext cx="3147215" cy="639772"/>
+            <a:chOff x="0" y="-1"/>
+            <a:chExt cx="3147214" cy="639771"/>
           </a:xfrm>
         </p:grpSpPr>
         <p:sp>
@@ -3679,8 +3679,8 @@
           </p:nvSpPr>
           <p:spPr>
             <a:xfrm>
-              <a:off x="0" y="-1"/>
-              <a:ext cx="3147212" cy="639770"/>
+              <a:off x="-1" y="-2"/>
+              <a:ext cx="3147216" cy="639773"/>
             </a:xfrm>
             <a:prstGeom prst="roundRect">
               <a:avLst>
@@ -3787,7 +3787,7 @@
         <p:spPr>
           <a:xfrm>
             <a:off x="9841062" y="5896990"/>
-            <a:ext cx="1910259" cy="825501"/>
+            <a:ext cx="1643262" cy="825501"/>
           </a:xfrm>
           <a:prstGeom prst="rect">
             <a:avLst/>
@@ -3815,7 +3815,11 @@
               </a:defRPr>
             </a:pPr>
             <a:r>
-              <a:t>µOS++ </a:t>
+              <a:t>µOS++</a:t>
+            </a:r>
+            <a:r>
+              <a:rPr b="0"/>
+              <a:t> provides</a:t>
             </a:r>
           </a:p>
           <a:p>
@@ -3827,7 +3831,7 @@
               </a:defRPr>
             </a:pPr>
             <a:r>
-              <a:t>as a C++ reference</a:t>
+              <a:t>a C++ reference</a:t>
             </a:r>
           </a:p>
           <a:p>
@@ -3853,7 +3857,7 @@
         <p:spPr>
           <a:xfrm>
             <a:off x="9841062" y="8761948"/>
-            <a:ext cx="1910259" cy="825501"/>
+            <a:ext cx="1643262" cy="825501"/>
           </a:xfrm>
           <a:prstGeom prst="rect">
             <a:avLst/>
@@ -3881,7 +3885,11 @@
               </a:defRPr>
             </a:pPr>
             <a:r>
-              <a:t>µOS++ </a:t>
+              <a:t>µOS++</a:t>
+            </a:r>
+            <a:r>
+              <a:rPr b="0"/>
+              <a:t> provides</a:t>
             </a:r>
           </a:p>
           <a:p>
@@ -3893,7 +3901,7 @@
               </a:defRPr>
             </a:pPr>
             <a:r>
-              <a:t>as a C++ reference</a:t>
+              <a:t>a C++ reference</a:t>
             </a:r>
           </a:p>
           <a:p>
@@ -3919,7 +3927,7 @@
         <p:spPr>
           <a:xfrm>
             <a:off x="7775126" y="1224539"/>
-            <a:ext cx="3" cy="2945683"/>
+            <a:ext cx="4" cy="2945684"/>
           </a:xfrm>
           <a:prstGeom prst="line">
             <a:avLst/>
@@ -3948,8 +3956,8 @@
         </p:nvSpPr>
         <p:spPr>
           <a:xfrm>
-            <a:off x="10057662" y="1227848"/>
-            <a:ext cx="3" cy="852221"/>
+            <a:off x="10057662" y="1227847"/>
+            <a:ext cx="4" cy="852223"/>
           </a:xfrm>
           <a:prstGeom prst="line">
             <a:avLst/>
@@ -3978,8 +3986,8 @@
         </p:nvSpPr>
         <p:spPr>
           <a:xfrm>
-            <a:off x="5622006" y="1227848"/>
-            <a:ext cx="3" cy="852221"/>
+            <a:off x="5622006" y="1227847"/>
+            <a:ext cx="4" cy="852223"/>
           </a:xfrm>
           <a:prstGeom prst="line">
             <a:avLst/>
@@ -4009,7 +4017,7 @@
         <p:spPr>
           <a:xfrm>
             <a:off x="1373533" y="2080066"/>
-            <a:ext cx="2645869" cy="639768"/>
+            <a:ext cx="2645869" cy="639769"/>
           </a:xfrm>
           <a:prstGeom prst="roundRect">
             <a:avLst>
@@ -4109,7 +4117,7 @@
         <p:spPr>
           <a:xfrm>
             <a:off x="2696466" y="1227848"/>
-            <a:ext cx="3" cy="852222"/>
+            <a:ext cx="4" cy="852223"/>
           </a:xfrm>
           <a:prstGeom prst="line">
             <a:avLst/>
@@ -4138,8 +4146,8 @@
         </p:nvSpPr>
         <p:spPr>
           <a:xfrm>
-            <a:off x="1373533" y="272385"/>
-            <a:ext cx="10257737" cy="952159"/>
+            <a:off x="1373533" y="272384"/>
+            <a:ext cx="10257737" cy="952161"/>
           </a:xfrm>
           <a:prstGeom prst="roundRect">
             <a:avLst>
@@ -4195,7 +4203,7 @@
         <p:spPr>
           <a:xfrm>
             <a:off x="3119918" y="281842"/>
-            <a:ext cx="1883124" cy="406401"/>
+            <a:ext cx="1883123" cy="406401"/>
           </a:xfrm>
           <a:prstGeom prst="rect">
             <a:avLst/>
@@ -4326,8 +4334,8 @@
         </p:nvSpPr>
         <p:spPr>
           <a:xfrm>
-            <a:off x="1855487" y="748464"/>
-            <a:ext cx="1681961" cy="406401"/>
+            <a:off x="1855486" y="748464"/>
+            <a:ext cx="1681962" cy="406401"/>
           </a:xfrm>
           <a:prstGeom prst="rect">
             <a:avLst/>
@@ -4370,8 +4378,8 @@
         </p:nvSpPr>
         <p:spPr>
           <a:xfrm>
-            <a:off x="4750805" y="748464"/>
-            <a:ext cx="1742401" cy="406401"/>
+            <a:off x="4750804" y="748464"/>
+            <a:ext cx="1742402" cy="406401"/>
           </a:xfrm>
           <a:prstGeom prst="rect">
             <a:avLst/>
@@ -4415,7 +4423,7 @@
         <p:spPr>
           <a:xfrm>
             <a:off x="2696466" y="2719832"/>
-            <a:ext cx="3" cy="409918"/>
+            <a:ext cx="4" cy="409919"/>
           </a:xfrm>
           <a:prstGeom prst="line">
             <a:avLst/>
@@ -4445,7 +4453,7 @@
         <p:spPr>
           <a:xfrm>
             <a:off x="5622006" y="2719832"/>
-            <a:ext cx="3" cy="409918"/>
+            <a:ext cx="4" cy="409919"/>
           </a:xfrm>
           <a:prstGeom prst="line">
             <a:avLst/>
@@ -4474,8 +4482,8 @@
         </p:nvSpPr>
         <p:spPr>
           <a:xfrm>
-            <a:off x="10057662" y="2714987"/>
-            <a:ext cx="3" cy="409918"/>
+            <a:off x="10057662" y="2714986"/>
+            <a:ext cx="4" cy="409919"/>
           </a:xfrm>
           <a:prstGeom prst="line">
             <a:avLst/>
@@ -4505,7 +4513,7 @@
         <p:spPr>
           <a:xfrm>
             <a:off x="4219866" y="3764667"/>
-            <a:ext cx="3" cy="409918"/>
+            <a:ext cx="4" cy="409919"/>
           </a:xfrm>
           <a:prstGeom prst="line">
             <a:avLst/>
@@ -4535,7 +4543,7 @@
         <p:spPr>
           <a:xfrm>
             <a:off x="10057662" y="3764667"/>
-            <a:ext cx="3" cy="409918"/>
+            <a:ext cx="4" cy="409919"/>
           </a:xfrm>
           <a:prstGeom prst="line">
             <a:avLst/>
@@ -4565,7 +4573,7 @@
         <p:spPr>
           <a:xfrm>
             <a:off x="7775126" y="6943018"/>
-            <a:ext cx="3" cy="409919"/>
+            <a:ext cx="4" cy="409920"/>
           </a:xfrm>
           <a:prstGeom prst="line">
             <a:avLst/>
@@ -4595,7 +4603,7 @@
         <p:spPr>
           <a:xfrm>
             <a:off x="7775126" y="4814346"/>
-            <a:ext cx="3" cy="852222"/>
+            <a:ext cx="4" cy="852223"/>
           </a:xfrm>
           <a:prstGeom prst="line">
             <a:avLst/>
@@ -4625,7 +4633,7 @@
         <p:spPr>
           <a:xfrm>
             <a:off x="6493204" y="7992701"/>
-            <a:ext cx="3" cy="852220"/>
+            <a:ext cx="4" cy="852221"/>
           </a:xfrm>
           <a:prstGeom prst="line">
             <a:avLst/>
@@ -4654,8 +4662,8 @@
         </p:nvSpPr>
         <p:spPr>
           <a:xfrm>
-            <a:off x="1855487" y="5641275"/>
-            <a:ext cx="927299" cy="342901"/>
+            <a:off x="1855486" y="5641275"/>
+            <a:ext cx="927300" cy="342901"/>
           </a:xfrm>
           <a:prstGeom prst="rect">
             <a:avLst/>
@@ -4699,7 +4707,7 @@
         <p:spPr>
           <a:xfrm flipH="1">
             <a:off x="5122517" y="4809983"/>
-            <a:ext cx="3" cy="2555282"/>
+            <a:ext cx="4" cy="2555283"/>
           </a:xfrm>
           <a:prstGeom prst="line">
             <a:avLst/>
@@ -4728,8 +4736,8 @@
         </p:nvSpPr>
         <p:spPr>
           <a:xfrm flipH="1">
-            <a:off x="8582328" y="4819881"/>
-            <a:ext cx="2" cy="4034937"/>
+            <a:off x="8582328" y="4819880"/>
+            <a:ext cx="3" cy="4034939"/>
           </a:xfrm>
           <a:prstGeom prst="line">
             <a:avLst/>
@@ -4761,10 +4769,10 @@
         </p:nvGrpSpPr>
         <p:grpSpPr>
           <a:xfrm>
-            <a:off x="5882826" y="5674740"/>
-            <a:ext cx="3784607" cy="1270006"/>
+            <a:off x="5882825" y="5674740"/>
+            <a:ext cx="3784610" cy="1270008"/>
             <a:chOff x="0" y="0"/>
-            <a:chExt cx="3784606" cy="1270004"/>
+            <a:chExt cx="3784608" cy="1270006"/>
           </a:xfrm>
         </p:grpSpPr>
         <p:sp>
@@ -4776,7 +4784,7 @@
           <p:spPr>
             <a:xfrm>
               <a:off x="-1" y="0"/>
-              <a:ext cx="3784608" cy="1270005"/>
+              <a:ext cx="3784609" cy="1270007"/>
             </a:xfrm>
             <a:prstGeom prst="roundRect">
               <a:avLst>
@@ -4893,7 +4901,7 @@
         <p:spPr>
           <a:xfrm>
             <a:off x="3337369" y="7352934"/>
-            <a:ext cx="6330064" cy="639768"/>
+            <a:ext cx="6330065" cy="639769"/>
           </a:xfrm>
           <a:prstGeom prst="roundRect">
             <a:avLst>
@@ -4992,7 +5000,7 @@
         </p:nvSpPr>
         <p:spPr>
           <a:xfrm>
-            <a:off x="7775128" y="281842"/>
+            <a:off x="7775127" y="281842"/>
             <a:ext cx="2179788" cy="406401"/>
           </a:xfrm>
           <a:prstGeom prst="rect">
@@ -5037,16 +5045,13 @@
         <p:spPr>
           <a:xfrm>
             <a:off x="1373533" y="5641275"/>
-            <a:ext cx="291339" cy="317502"/>
+            <a:ext cx="291340" cy="317503"/>
           </a:xfrm>
           <a:prstGeom prst="rect">
             <a:avLst/>
           </a:prstGeom>
           <a:solidFill>
-            <a:schemeClr val="accent1">
-              <a:satOff val="-36923"/>
-              <a:lumOff val="15441"/>
-            </a:schemeClr>
+            <a:srgbClr val="428BD0"/>
           </a:solidFill>
           <a:ln w="12700">
             <a:miter lim="400000"/>
@@ -5081,8 +5086,8 @@
         </p:nvSpPr>
         <p:spPr>
           <a:xfrm>
-            <a:off x="1373533" y="6087623"/>
-            <a:ext cx="291339" cy="317502"/>
+            <a:off x="1373533" y="6087622"/>
+            <a:ext cx="291340" cy="317503"/>
           </a:xfrm>
           <a:prstGeom prst="rect">
             <a:avLst/>
@@ -5126,8 +5131,8 @@
         </p:nvSpPr>
         <p:spPr>
           <a:xfrm>
-            <a:off x="1373533" y="6519848"/>
-            <a:ext cx="291339" cy="317502"/>
+            <a:off x="1373533" y="6519847"/>
+            <a:ext cx="291340" cy="317503"/>
           </a:xfrm>
           <a:prstGeom prst="rect">
             <a:avLst/>
@@ -5170,8 +5175,8 @@
         </p:nvSpPr>
         <p:spPr>
           <a:xfrm>
-            <a:off x="1855487" y="6087624"/>
-            <a:ext cx="1378546" cy="342901"/>
+            <a:off x="1855486" y="6087624"/>
+            <a:ext cx="1378547" cy="342901"/>
           </a:xfrm>
           <a:prstGeom prst="rect">
             <a:avLst/>
@@ -5214,7 +5219,7 @@
         </p:nvSpPr>
         <p:spPr>
           <a:xfrm>
-            <a:off x="1855487" y="6519848"/>
+            <a:off x="1855486" y="6519847"/>
             <a:ext cx="566044" cy="342901"/>
           </a:xfrm>
           <a:prstGeom prst="rect">
@@ -5246,6 +5251,206 @@
             <a:pPr/>
             <a:r>
               <a:t>APIs</a:t>
+            </a:r>
+          </a:p>
+        </p:txBody>
+      </p:sp>
+      <p:sp>
+        <p:nvSpPr>
+          <p:cNvPr id="176" name="Shape 176"/>
+          <p:cNvSpPr/>
+          <p:nvPr/>
+        </p:nvSpPr>
+        <p:spPr>
+          <a:xfrm>
+            <a:off x="2805688" y="1749820"/>
+            <a:ext cx="2155599" cy="342901"/>
+          </a:xfrm>
+          <a:prstGeom prst="rect">
+            <a:avLst/>
+          </a:prstGeom>
+          <a:ln w="12700">
+            <a:miter lim="400000"/>
+          </a:ln>
+          <a:extLst>
+            <a:ext uri="{C572A759-6A51-4108-AA02-DFA0A04FC94B}">
+              <ma14:wrappingTextBoxFlag xmlns:ma14="http://schemas.microsoft.com/office/mac/drawingml/2011/main" val="1"/>
+            </a:ext>
+          </a:extLst>
+        </p:spPr>
+        <p:txBody>
+          <a:bodyPr lIns="50800" tIns="50800" rIns="50800" bIns="50800" anchor="ctr">
+            <a:spAutoFit/>
+          </a:bodyPr>
+          <a:lstStyle>
+            <a:lvl1pPr algn="l">
+              <a:defRPr b="1" sz="1600"/>
+            </a:lvl1pPr>
+          </a:lstStyle>
+          <a:p>
+            <a:pPr/>
+            <a:r>
+              <a:t>(Old API)</a:t>
+            </a:r>
+          </a:p>
+        </p:txBody>
+      </p:sp>
+      <p:sp>
+        <p:nvSpPr>
+          <p:cNvPr id="177" name="Shape 177"/>
+          <p:cNvSpPr/>
+          <p:nvPr/>
+        </p:nvSpPr>
+        <p:spPr>
+          <a:xfrm>
+            <a:off x="5731228" y="1737165"/>
+            <a:ext cx="2587841" cy="342901"/>
+          </a:xfrm>
+          <a:prstGeom prst="rect">
+            <a:avLst/>
+          </a:prstGeom>
+          <a:ln w="12700">
+            <a:miter lim="400000"/>
+          </a:ln>
+          <a:extLst>
+            <a:ext uri="{C572A759-6A51-4108-AA02-DFA0A04FC94B}">
+              <ma14:wrappingTextBoxFlag xmlns:ma14="http://schemas.microsoft.com/office/mac/drawingml/2011/main" val="1"/>
+            </a:ext>
+          </a:extLst>
+        </p:spPr>
+        <p:txBody>
+          <a:bodyPr lIns="50800" tIns="50800" rIns="50800" bIns="50800" anchor="ctr">
+            <a:spAutoFit/>
+          </a:bodyPr>
+          <a:lstStyle>
+            <a:lvl1pPr algn="l">
+              <a:defRPr b="1" sz="1600"/>
+            </a:lvl1pPr>
+          </a:lstStyle>
+          <a:p>
+            <a:pPr/>
+            <a:r>
+              <a:t>(New API)</a:t>
+            </a:r>
+          </a:p>
+        </p:txBody>
+      </p:sp>
+      <p:sp>
+        <p:nvSpPr>
+          <p:cNvPr id="178" name="Shape 178"/>
+          <p:cNvSpPr/>
+          <p:nvPr/>
+        </p:nvSpPr>
+        <p:spPr>
+          <a:xfrm>
+            <a:off x="5208479" y="3827318"/>
+            <a:ext cx="2587842" cy="342901"/>
+          </a:xfrm>
+          <a:prstGeom prst="rect">
+            <a:avLst/>
+          </a:prstGeom>
+          <a:ln w="12700">
+            <a:miter lim="400000"/>
+          </a:ln>
+          <a:extLst>
+            <a:ext uri="{C572A759-6A51-4108-AA02-DFA0A04FC94B}">
+              <ma14:wrappingTextBoxFlag xmlns:ma14="http://schemas.microsoft.com/office/mac/drawingml/2011/main" val="1"/>
+            </a:ext>
+          </a:extLst>
+        </p:spPr>
+        <p:txBody>
+          <a:bodyPr lIns="50800" tIns="50800" rIns="50800" bIns="50800" anchor="ctr">
+            <a:spAutoFit/>
+          </a:bodyPr>
+          <a:lstStyle>
+            <a:lvl1pPr>
+              <a:defRPr b="1" sz="1600"/>
+            </a:lvl1pPr>
+          </a:lstStyle>
+          <a:p>
+            <a:pPr/>
+            <a:r>
+              <a:t>(Native API)</a:t>
+            </a:r>
+          </a:p>
+        </p:txBody>
+      </p:sp>
+      <p:sp>
+        <p:nvSpPr>
+          <p:cNvPr id="179" name="Shape 179"/>
+          <p:cNvSpPr/>
+          <p:nvPr/>
+        </p:nvSpPr>
+        <p:spPr>
+          <a:xfrm>
+            <a:off x="10166884" y="1749820"/>
+            <a:ext cx="2587841" cy="342901"/>
+          </a:xfrm>
+          <a:prstGeom prst="rect">
+            <a:avLst/>
+          </a:prstGeom>
+          <a:ln w="12700">
+            <a:miter lim="400000"/>
+          </a:ln>
+          <a:extLst>
+            <a:ext uri="{C572A759-6A51-4108-AA02-DFA0A04FC94B}">
+              <ma14:wrappingTextBoxFlag xmlns:ma14="http://schemas.microsoft.com/office/mac/drawingml/2011/main" val="1"/>
+            </a:ext>
+          </a:extLst>
+        </p:spPr>
+        <p:txBody>
+          <a:bodyPr lIns="50800" tIns="50800" rIns="50800" bIns="50800" anchor="ctr">
+            <a:spAutoFit/>
+          </a:bodyPr>
+          <a:lstStyle>
+            <a:lvl1pPr algn="l">
+              <a:defRPr b="1" sz="1600"/>
+            </a:lvl1pPr>
+          </a:lstStyle>
+          <a:p>
+            <a:pPr/>
+            <a:r>
+              <a:t>(std C++ API)</a:t>
+            </a:r>
+          </a:p>
+        </p:txBody>
+      </p:sp>
+      <p:sp>
+        <p:nvSpPr>
+          <p:cNvPr id="180" name="Shape 180"/>
+          <p:cNvSpPr/>
+          <p:nvPr/>
+        </p:nvSpPr>
+        <p:spPr>
+          <a:xfrm>
+            <a:off x="5208479" y="6998021"/>
+            <a:ext cx="2587842" cy="342901"/>
+          </a:xfrm>
+          <a:prstGeom prst="rect">
+            <a:avLst/>
+          </a:prstGeom>
+          <a:ln w="12700">
+            <a:miter lim="400000"/>
+          </a:ln>
+          <a:extLst>
+            <a:ext uri="{C572A759-6A51-4108-AA02-DFA0A04FC94B}">
+              <ma14:wrappingTextBoxFlag xmlns:ma14="http://schemas.microsoft.com/office/mac/drawingml/2011/main" val="1"/>
+            </a:ext>
+          </a:extLst>
+        </p:spPr>
+        <p:txBody>
+          <a:bodyPr lIns="50800" tIns="50800" rIns="50800" bIns="50800" anchor="ctr">
+            <a:spAutoFit/>
+          </a:bodyPr>
+          <a:lstStyle>
+            <a:lvl1pPr>
+              <a:defRPr b="1" sz="1600"/>
+            </a:lvl1pPr>
+          </a:lstStyle>
+          <a:p>
+            <a:pPr/>
+            <a:r>
+              <a:t>(Internal API)</a:t>
             </a:r>
           </a:p>
         </p:txBody>

</xml_diff>

<commit_message>
cmsis-plus-rtos-overview: lower case thread
</commit_message>
<xml_diff>
--- a/assets/images/2016/cmsis-plus-rtos-overview.pptx
+++ b/assets/images/2016/cmsis-plus-rtos-overview.pptx
@@ -63,9 +63,9 @@
         </a:solidFill>
         <a:effectLst/>
         <a:uFillTx/>
-        <a:latin typeface="+mn-lt"/>
-        <a:ea typeface="+mn-ea"/>
-        <a:cs typeface="+mn-cs"/>
+        <a:latin typeface="+mj-lt"/>
+        <a:ea typeface="+mj-ea"/>
+        <a:cs typeface="+mj-cs"/>
         <a:sym typeface="Helvetica"/>
       </a:defRPr>
     </a:lvl1pPr>
@@ -93,9 +93,9 @@
         </a:solidFill>
         <a:effectLst/>
         <a:uFillTx/>
-        <a:latin typeface="+mn-lt"/>
-        <a:ea typeface="+mn-ea"/>
-        <a:cs typeface="+mn-cs"/>
+        <a:latin typeface="+mj-lt"/>
+        <a:ea typeface="+mj-ea"/>
+        <a:cs typeface="+mj-cs"/>
         <a:sym typeface="Helvetica"/>
       </a:defRPr>
     </a:lvl2pPr>
@@ -123,9 +123,9 @@
         </a:solidFill>
         <a:effectLst/>
         <a:uFillTx/>
-        <a:latin typeface="+mn-lt"/>
-        <a:ea typeface="+mn-ea"/>
-        <a:cs typeface="+mn-cs"/>
+        <a:latin typeface="+mj-lt"/>
+        <a:ea typeface="+mj-ea"/>
+        <a:cs typeface="+mj-cs"/>
         <a:sym typeface="Helvetica"/>
       </a:defRPr>
     </a:lvl3pPr>
@@ -153,9 +153,9 @@
         </a:solidFill>
         <a:effectLst/>
         <a:uFillTx/>
-        <a:latin typeface="+mn-lt"/>
-        <a:ea typeface="+mn-ea"/>
-        <a:cs typeface="+mn-cs"/>
+        <a:latin typeface="+mj-lt"/>
+        <a:ea typeface="+mj-ea"/>
+        <a:cs typeface="+mj-cs"/>
         <a:sym typeface="Helvetica"/>
       </a:defRPr>
     </a:lvl4pPr>
@@ -183,9 +183,9 @@
         </a:solidFill>
         <a:effectLst/>
         <a:uFillTx/>
-        <a:latin typeface="+mn-lt"/>
-        <a:ea typeface="+mn-ea"/>
-        <a:cs typeface="+mn-cs"/>
+        <a:latin typeface="+mj-lt"/>
+        <a:ea typeface="+mj-ea"/>
+        <a:cs typeface="+mj-cs"/>
         <a:sym typeface="Helvetica"/>
       </a:defRPr>
     </a:lvl5pPr>
@@ -213,9 +213,9 @@
         </a:solidFill>
         <a:effectLst/>
         <a:uFillTx/>
-        <a:latin typeface="+mn-lt"/>
-        <a:ea typeface="+mn-ea"/>
-        <a:cs typeface="+mn-cs"/>
+        <a:latin typeface="+mj-lt"/>
+        <a:ea typeface="+mj-ea"/>
+        <a:cs typeface="+mj-cs"/>
         <a:sym typeface="Helvetica"/>
       </a:defRPr>
     </a:lvl6pPr>
@@ -243,9 +243,9 @@
         </a:solidFill>
         <a:effectLst/>
         <a:uFillTx/>
-        <a:latin typeface="+mn-lt"/>
-        <a:ea typeface="+mn-ea"/>
-        <a:cs typeface="+mn-cs"/>
+        <a:latin typeface="+mj-lt"/>
+        <a:ea typeface="+mj-ea"/>
+        <a:cs typeface="+mj-cs"/>
         <a:sym typeface="Helvetica"/>
       </a:defRPr>
     </a:lvl7pPr>
@@ -273,9 +273,9 @@
         </a:solidFill>
         <a:effectLst/>
         <a:uFillTx/>
-        <a:latin typeface="+mn-lt"/>
-        <a:ea typeface="+mn-ea"/>
-        <a:cs typeface="+mn-cs"/>
+        <a:latin typeface="+mj-lt"/>
+        <a:ea typeface="+mj-ea"/>
+        <a:cs typeface="+mj-cs"/>
         <a:sym typeface="Helvetica"/>
       </a:defRPr>
     </a:lvl8pPr>
@@ -303,9 +303,9 @@
         </a:solidFill>
         <a:effectLst/>
         <a:uFillTx/>
-        <a:latin typeface="+mn-lt"/>
-        <a:ea typeface="+mn-ea"/>
-        <a:cs typeface="+mn-cs"/>
+        <a:latin typeface="+mj-lt"/>
+        <a:ea typeface="+mj-ea"/>
+        <a:cs typeface="+mj-cs"/>
         <a:sym typeface="Helvetica"/>
       </a:defRPr>
     </a:lvl9pPr>
@@ -393,9 +393,9 @@
         <a:spcPct val="117999"/>
       </a:lnSpc>
       <a:defRPr sz="2200">
-        <a:latin typeface="+mj-lt"/>
-        <a:ea typeface="+mj-ea"/>
-        <a:cs typeface="+mj-cs"/>
+        <a:latin typeface="+mn-lt"/>
+        <a:ea typeface="+mn-ea"/>
+        <a:cs typeface="+mn-cs"/>
         <a:sym typeface="Helvetica Neue"/>
       </a:defRPr>
     </a:lvl1pPr>
@@ -404,9 +404,9 @@
         <a:spcPct val="117999"/>
       </a:lnSpc>
       <a:defRPr sz="2200">
-        <a:latin typeface="+mj-lt"/>
-        <a:ea typeface="+mj-ea"/>
-        <a:cs typeface="+mj-cs"/>
+        <a:latin typeface="+mn-lt"/>
+        <a:ea typeface="+mn-ea"/>
+        <a:cs typeface="+mn-cs"/>
         <a:sym typeface="Helvetica Neue"/>
       </a:defRPr>
     </a:lvl2pPr>
@@ -415,9 +415,9 @@
         <a:spcPct val="117999"/>
       </a:lnSpc>
       <a:defRPr sz="2200">
-        <a:latin typeface="+mj-lt"/>
-        <a:ea typeface="+mj-ea"/>
-        <a:cs typeface="+mj-cs"/>
+        <a:latin typeface="+mn-lt"/>
+        <a:ea typeface="+mn-ea"/>
+        <a:cs typeface="+mn-cs"/>
         <a:sym typeface="Helvetica Neue"/>
       </a:defRPr>
     </a:lvl3pPr>
@@ -426,9 +426,9 @@
         <a:spcPct val="117999"/>
       </a:lnSpc>
       <a:defRPr sz="2200">
-        <a:latin typeface="+mj-lt"/>
-        <a:ea typeface="+mj-ea"/>
-        <a:cs typeface="+mj-cs"/>
+        <a:latin typeface="+mn-lt"/>
+        <a:ea typeface="+mn-ea"/>
+        <a:cs typeface="+mn-cs"/>
         <a:sym typeface="Helvetica Neue"/>
       </a:defRPr>
     </a:lvl4pPr>
@@ -437,9 +437,9 @@
         <a:spcPct val="117999"/>
       </a:lnSpc>
       <a:defRPr sz="2200">
-        <a:latin typeface="+mj-lt"/>
-        <a:ea typeface="+mj-ea"/>
-        <a:cs typeface="+mj-cs"/>
+        <a:latin typeface="+mn-lt"/>
+        <a:ea typeface="+mn-ea"/>
+        <a:cs typeface="+mn-cs"/>
         <a:sym typeface="Helvetica Neue"/>
       </a:defRPr>
     </a:lvl5pPr>
@@ -448,9 +448,9 @@
         <a:spcPct val="117999"/>
       </a:lnSpc>
       <a:defRPr sz="2200">
-        <a:latin typeface="+mj-lt"/>
-        <a:ea typeface="+mj-ea"/>
-        <a:cs typeface="+mj-cs"/>
+        <a:latin typeface="+mn-lt"/>
+        <a:ea typeface="+mn-ea"/>
+        <a:cs typeface="+mn-cs"/>
         <a:sym typeface="Helvetica Neue"/>
       </a:defRPr>
     </a:lvl6pPr>
@@ -459,9 +459,9 @@
         <a:spcPct val="117999"/>
       </a:lnSpc>
       <a:defRPr sz="2200">
-        <a:latin typeface="+mj-lt"/>
-        <a:ea typeface="+mj-ea"/>
-        <a:cs typeface="+mj-cs"/>
+        <a:latin typeface="+mn-lt"/>
+        <a:ea typeface="+mn-ea"/>
+        <a:cs typeface="+mn-cs"/>
         <a:sym typeface="Helvetica Neue"/>
       </a:defRPr>
     </a:lvl7pPr>
@@ -470,9 +470,9 @@
         <a:spcPct val="117999"/>
       </a:lnSpc>
       <a:defRPr sz="2200">
-        <a:latin typeface="+mj-lt"/>
-        <a:ea typeface="+mj-ea"/>
-        <a:cs typeface="+mj-cs"/>
+        <a:latin typeface="+mn-lt"/>
+        <a:ea typeface="+mn-ea"/>
+        <a:cs typeface="+mn-cs"/>
         <a:sym typeface="Helvetica Neue"/>
       </a:defRPr>
     </a:lvl8pPr>
@@ -481,9 +481,9 @@
         <a:spcPct val="117999"/>
       </a:lnSpc>
       <a:defRPr sz="2200">
-        <a:latin typeface="+mj-lt"/>
-        <a:ea typeface="+mj-ea"/>
-        <a:cs typeface="+mj-cs"/>
+        <a:latin typeface="+mn-lt"/>
+        <a:ea typeface="+mn-ea"/>
+        <a:cs typeface="+mn-cs"/>
         <a:sym typeface="Helvetica Neue"/>
       </a:defRPr>
     </a:lvl9pPr>
@@ -1898,7 +1898,7 @@
         <p:spPr>
           <a:xfrm>
             <a:off x="6724518" y="889000"/>
-            <a:ext cx="5334006" cy="3771900"/>
+            <a:ext cx="5334007" cy="3771900"/>
           </a:xfrm>
           <a:prstGeom prst="rect">
             <a:avLst/>
@@ -2984,7 +2984,7 @@
         <p:spPr>
           <a:xfrm rot="1">
             <a:off x="927002" y="5202356"/>
-            <a:ext cx="11150797" cy="76203"/>
+            <a:ext cx="11150797" cy="76204"/>
           </a:xfrm>
           <a:prstGeom prst="rect">
             <a:avLst/>
@@ -3013,7 +3013,7 @@
         <p:spPr>
           <a:xfrm>
             <a:off x="927002" y="1615856"/>
-            <a:ext cx="11150797" cy="76203"/>
+            <a:ext cx="11150797" cy="76204"/>
           </a:xfrm>
           <a:prstGeom prst="rect">
             <a:avLst/>
@@ -3031,10 +3031,10 @@
         </p:nvGrpSpPr>
         <p:grpSpPr>
           <a:xfrm>
-            <a:off x="3337369" y="8854815"/>
-            <a:ext cx="6330066" cy="639770"/>
+            <a:off x="3337368" y="8854814"/>
+            <a:ext cx="6330068" cy="639773"/>
             <a:chOff x="0" y="0"/>
-            <a:chExt cx="6330065" cy="639768"/>
+            <a:chExt cx="6330067" cy="639771"/>
           </a:xfrm>
         </p:grpSpPr>
         <p:sp>
@@ -3046,7 +3046,7 @@
           <p:spPr>
             <a:xfrm>
               <a:off x="-1" y="-1"/>
-              <a:ext cx="6330067" cy="639770"/>
+              <a:ext cx="6330068" cy="639773"/>
             </a:xfrm>
             <a:prstGeom prst="roundRect">
               <a:avLst>
@@ -3152,10 +3152,10 @@
         </p:nvGrpSpPr>
         <p:grpSpPr>
           <a:xfrm>
-            <a:off x="1373532" y="4170218"/>
-            <a:ext cx="10257740" cy="639770"/>
-            <a:chOff x="0" y="0"/>
-            <a:chExt cx="10257738" cy="639768"/>
+            <a:off x="1373530" y="4170216"/>
+            <a:ext cx="10257743" cy="639773"/>
+            <a:chOff x="-1" y="0"/>
+            <a:chExt cx="10257742" cy="639771"/>
           </a:xfrm>
         </p:grpSpPr>
         <p:sp>
@@ -3166,8 +3166,8 @@
           </p:nvSpPr>
           <p:spPr>
             <a:xfrm>
-              <a:off x="-1" y="-1"/>
-              <a:ext cx="10257740" cy="639770"/>
+              <a:off x="-2" y="-1"/>
+              <a:ext cx="10257743" cy="639773"/>
             </a:xfrm>
             <a:prstGeom prst="roundRect">
               <a:avLst>
@@ -3284,7 +3284,7 @@
         <p:spPr>
           <a:xfrm rot="1">
             <a:off x="927002" y="8388194"/>
-            <a:ext cx="11150797" cy="76203"/>
+            <a:ext cx="11150797" cy="76204"/>
           </a:xfrm>
           <a:prstGeom prst="rect">
             <a:avLst/>
@@ -3302,10 +3302,10 @@
         </p:nvGrpSpPr>
         <p:grpSpPr>
           <a:xfrm>
-            <a:off x="1373530" y="3124903"/>
-            <a:ext cx="5692677" cy="639770"/>
-            <a:chOff x="0" y="0"/>
-            <a:chExt cx="5692675" cy="639768"/>
+            <a:off x="1373528" y="3124902"/>
+            <a:ext cx="5692680" cy="639772"/>
+            <a:chOff x="-1" y="-1"/>
+            <a:chExt cx="5692678" cy="639771"/>
           </a:xfrm>
         </p:grpSpPr>
         <p:sp>
@@ -3316,8 +3316,8 @@
           </p:nvSpPr>
           <p:spPr>
             <a:xfrm>
-              <a:off x="-1" y="-1"/>
-              <a:ext cx="5692676" cy="639769"/>
+              <a:off x="-2" y="-2"/>
+              <a:ext cx="5692680" cy="639773"/>
             </a:xfrm>
             <a:prstGeom prst="roundRect">
               <a:avLst>
@@ -3423,10 +3423,10 @@
         </p:nvGrpSpPr>
         <p:grpSpPr>
           <a:xfrm>
-            <a:off x="4177812" y="2080066"/>
-            <a:ext cx="2888395" cy="639772"/>
+            <a:off x="4177811" y="2080065"/>
+            <a:ext cx="2888397" cy="639775"/>
             <a:chOff x="0" y="-1"/>
-            <a:chExt cx="2888394" cy="639771"/>
+            <a:chExt cx="2888396" cy="639774"/>
           </a:xfrm>
         </p:grpSpPr>
         <p:sp>
@@ -3438,7 +3438,7 @@
           <p:spPr>
             <a:xfrm>
               <a:off x="0" y="-2"/>
-              <a:ext cx="2888394" cy="639773"/>
+              <a:ext cx="2888396" cy="639776"/>
             </a:xfrm>
             <a:prstGeom prst="roundRect">
               <a:avLst>
@@ -3496,8 +3496,8 @@
           </p:nvSpPr>
           <p:spPr>
             <a:xfrm>
-              <a:off x="-1" y="116682"/>
-              <a:ext cx="2888396" cy="406401"/>
+              <a:off x="-1" y="116683"/>
+              <a:ext cx="2888397" cy="406401"/>
             </a:xfrm>
             <a:prstGeom prst="rect">
               <a:avLst/>
@@ -3544,10 +3544,10 @@
         </p:nvGrpSpPr>
         <p:grpSpPr>
           <a:xfrm>
-            <a:off x="8484058" y="3124903"/>
-            <a:ext cx="3147215" cy="639770"/>
-            <a:chOff x="0" y="0"/>
-            <a:chExt cx="3147214" cy="639768"/>
+            <a:off x="8484057" y="3124902"/>
+            <a:ext cx="3147218" cy="639772"/>
+            <a:chOff x="-1" y="-1"/>
+            <a:chExt cx="3147217" cy="639771"/>
           </a:xfrm>
         </p:grpSpPr>
         <p:sp>
@@ -3558,8 +3558,8 @@
           </p:nvSpPr>
           <p:spPr>
             <a:xfrm>
-              <a:off x="-1" y="-1"/>
-              <a:ext cx="3147216" cy="639769"/>
+              <a:off x="-2" y="-2"/>
+              <a:ext cx="3147219" cy="639773"/>
             </a:xfrm>
             <a:prstGeom prst="roundRect">
               <a:avLst>
@@ -3618,7 +3618,7 @@
           <p:spPr>
             <a:xfrm>
               <a:off x="522014" y="116680"/>
-              <a:ext cx="2161184" cy="406401"/>
+              <a:ext cx="2161183" cy="406401"/>
             </a:xfrm>
             <a:prstGeom prst="rect">
               <a:avLst/>
@@ -3665,10 +3665,10 @@
         </p:nvGrpSpPr>
         <p:grpSpPr>
           <a:xfrm>
-            <a:off x="8484058" y="2080066"/>
-            <a:ext cx="3147215" cy="639772"/>
-            <a:chOff x="0" y="-1"/>
-            <a:chExt cx="3147214" cy="639771"/>
+            <a:off x="8484057" y="2080065"/>
+            <a:ext cx="3147218" cy="639775"/>
+            <a:chOff x="-1" y="-1"/>
+            <a:chExt cx="3147217" cy="639774"/>
           </a:xfrm>
         </p:grpSpPr>
         <p:sp>
@@ -3679,8 +3679,8 @@
           </p:nvSpPr>
           <p:spPr>
             <a:xfrm>
-              <a:off x="-1" y="-2"/>
-              <a:ext cx="3147216" cy="639773"/>
+              <a:off x="-2" y="-2"/>
+              <a:ext cx="3147219" cy="639776"/>
             </a:xfrm>
             <a:prstGeom prst="roundRect">
               <a:avLst>
@@ -3738,7 +3738,7 @@
           </p:nvSpPr>
           <p:spPr>
             <a:xfrm>
-              <a:off x="250669" y="116683"/>
+              <a:off x="250669" y="116684"/>
               <a:ext cx="2645867" cy="406401"/>
             </a:xfrm>
             <a:prstGeom prst="rect">
@@ -3927,7 +3927,7 @@
         <p:spPr>
           <a:xfrm>
             <a:off x="7775126" y="1224539"/>
-            <a:ext cx="4" cy="2945684"/>
+            <a:ext cx="5" cy="2945685"/>
           </a:xfrm>
           <a:prstGeom prst="line">
             <a:avLst/>
@@ -3956,8 +3956,8 @@
         </p:nvSpPr>
         <p:spPr>
           <a:xfrm>
-            <a:off x="10057662" y="1227847"/>
-            <a:ext cx="4" cy="852223"/>
+            <a:off x="10057662" y="1227846"/>
+            <a:ext cx="5" cy="852224"/>
           </a:xfrm>
           <a:prstGeom prst="line">
             <a:avLst/>
@@ -3986,8 +3986,8 @@
         </p:nvSpPr>
         <p:spPr>
           <a:xfrm>
-            <a:off x="5622006" y="1227847"/>
-            <a:ext cx="4" cy="852223"/>
+            <a:off x="5622006" y="1227846"/>
+            <a:ext cx="5" cy="852224"/>
           </a:xfrm>
           <a:prstGeom prst="line">
             <a:avLst/>
@@ -4017,7 +4017,7 @@
         <p:spPr>
           <a:xfrm>
             <a:off x="1373533" y="2080066"/>
-            <a:ext cx="2645869" cy="639769"/>
+            <a:ext cx="2645869" cy="639770"/>
           </a:xfrm>
           <a:prstGeom prst="roundRect">
             <a:avLst>
@@ -4117,7 +4117,7 @@
         <p:spPr>
           <a:xfrm>
             <a:off x="2696466" y="1227848"/>
-            <a:ext cx="4" cy="852223"/>
+            <a:ext cx="5" cy="852224"/>
           </a:xfrm>
           <a:prstGeom prst="line">
             <a:avLst/>
@@ -4277,7 +4277,7 @@
           <a:p>
             <a:pPr/>
             <a:r>
-              <a:t>os::rtos::Thread</a:t>
+              <a:t>os::rtos::thread</a:t>
             </a:r>
           </a:p>
         </p:txBody>
@@ -4378,8 +4378,8 @@
         </p:nvSpPr>
         <p:spPr>
           <a:xfrm>
-            <a:off x="4750804" y="748464"/>
-            <a:ext cx="1742402" cy="406401"/>
+            <a:off x="4750803" y="748464"/>
+            <a:ext cx="1742403" cy="406401"/>
           </a:xfrm>
           <a:prstGeom prst="rect">
             <a:avLst/>
@@ -4423,7 +4423,7 @@
         <p:spPr>
           <a:xfrm>
             <a:off x="2696466" y="2719832"/>
-            <a:ext cx="4" cy="409919"/>
+            <a:ext cx="5" cy="409920"/>
           </a:xfrm>
           <a:prstGeom prst="line">
             <a:avLst/>
@@ -4453,7 +4453,7 @@
         <p:spPr>
           <a:xfrm>
             <a:off x="5622006" y="2719832"/>
-            <a:ext cx="4" cy="409919"/>
+            <a:ext cx="5" cy="409920"/>
           </a:xfrm>
           <a:prstGeom prst="line">
             <a:avLst/>
@@ -4483,7 +4483,7 @@
         <p:spPr>
           <a:xfrm>
             <a:off x="10057662" y="2714986"/>
-            <a:ext cx="4" cy="409919"/>
+            <a:ext cx="5" cy="409920"/>
           </a:xfrm>
           <a:prstGeom prst="line">
             <a:avLst/>
@@ -4513,7 +4513,7 @@
         <p:spPr>
           <a:xfrm>
             <a:off x="4219866" y="3764667"/>
-            <a:ext cx="4" cy="409919"/>
+            <a:ext cx="5" cy="409920"/>
           </a:xfrm>
           <a:prstGeom prst="line">
             <a:avLst/>
@@ -4543,7 +4543,7 @@
         <p:spPr>
           <a:xfrm>
             <a:off x="10057662" y="3764667"/>
-            <a:ext cx="4" cy="409919"/>
+            <a:ext cx="5" cy="409920"/>
           </a:xfrm>
           <a:prstGeom prst="line">
             <a:avLst/>
@@ -4573,7 +4573,7 @@
         <p:spPr>
           <a:xfrm>
             <a:off x="7775126" y="6943018"/>
-            <a:ext cx="4" cy="409920"/>
+            <a:ext cx="5" cy="409921"/>
           </a:xfrm>
           <a:prstGeom prst="line">
             <a:avLst/>
@@ -4603,7 +4603,7 @@
         <p:spPr>
           <a:xfrm>
             <a:off x="7775126" y="4814346"/>
-            <a:ext cx="4" cy="852223"/>
+            <a:ext cx="5" cy="852224"/>
           </a:xfrm>
           <a:prstGeom prst="line">
             <a:avLst/>
@@ -4633,7 +4633,7 @@
         <p:spPr>
           <a:xfrm>
             <a:off x="6493204" y="7992701"/>
-            <a:ext cx="4" cy="852221"/>
+            <a:ext cx="5" cy="852222"/>
           </a:xfrm>
           <a:prstGeom prst="line">
             <a:avLst/>
@@ -4662,7 +4662,7 @@
         </p:nvSpPr>
         <p:spPr>
           <a:xfrm>
-            <a:off x="1855486" y="5641275"/>
+            <a:off x="1855485" y="5641275"/>
             <a:ext cx="927300" cy="342901"/>
           </a:xfrm>
           <a:prstGeom prst="rect">
@@ -4707,7 +4707,7 @@
         <p:spPr>
           <a:xfrm flipH="1">
             <a:off x="5122517" y="4809983"/>
-            <a:ext cx="4" cy="2555283"/>
+            <a:ext cx="5" cy="2555284"/>
           </a:xfrm>
           <a:prstGeom prst="line">
             <a:avLst/>
@@ -4736,8 +4736,8 @@
         </p:nvSpPr>
         <p:spPr>
           <a:xfrm flipH="1">
-            <a:off x="8582328" y="4819880"/>
-            <a:ext cx="3" cy="4034939"/>
+            <a:off x="8582328" y="4819879"/>
+            <a:ext cx="4" cy="4034940"/>
           </a:xfrm>
           <a:prstGeom prst="line">
             <a:avLst/>
@@ -4769,10 +4769,10 @@
         </p:nvGrpSpPr>
         <p:grpSpPr>
           <a:xfrm>
-            <a:off x="5882825" y="5674740"/>
-            <a:ext cx="3784610" cy="1270008"/>
-            <a:chOff x="0" y="0"/>
-            <a:chExt cx="3784608" cy="1270006"/>
+            <a:off x="5882823" y="5674740"/>
+            <a:ext cx="3784613" cy="1270010"/>
+            <a:chOff x="-1" y="0"/>
+            <a:chExt cx="3784611" cy="1270009"/>
           </a:xfrm>
         </p:grpSpPr>
         <p:sp>
@@ -4783,8 +4783,8 @@
           </p:nvSpPr>
           <p:spPr>
             <a:xfrm>
-              <a:off x="-1" y="0"/>
-              <a:ext cx="3784609" cy="1270007"/>
+              <a:off x="-2" y="0"/>
+              <a:ext cx="3784613" cy="1270010"/>
             </a:xfrm>
             <a:prstGeom prst="roundRect">
               <a:avLst>
@@ -4901,7 +4901,7 @@
         <p:spPr>
           <a:xfrm>
             <a:off x="3337369" y="7352934"/>
-            <a:ext cx="6330065" cy="639769"/>
+            <a:ext cx="6330066" cy="639770"/>
           </a:xfrm>
           <a:prstGeom prst="roundRect">
             <a:avLst>
@@ -5000,7 +5000,7 @@
         </p:nvSpPr>
         <p:spPr>
           <a:xfrm>
-            <a:off x="7775127" y="281842"/>
+            <a:off x="7775126" y="281842"/>
             <a:ext cx="2179788" cy="406401"/>
           </a:xfrm>
           <a:prstGeom prst="rect">
@@ -5045,7 +5045,7 @@
         <p:spPr>
           <a:xfrm>
             <a:off x="1373533" y="5641275"/>
-            <a:ext cx="291340" cy="317503"/>
+            <a:ext cx="291341" cy="317504"/>
           </a:xfrm>
           <a:prstGeom prst="rect">
             <a:avLst/>
@@ -5086,8 +5086,8 @@
         </p:nvSpPr>
         <p:spPr>
           <a:xfrm>
-            <a:off x="1373533" y="6087622"/>
-            <a:ext cx="291340" cy="317503"/>
+            <a:off x="1373533" y="6087621"/>
+            <a:ext cx="291341" cy="317504"/>
           </a:xfrm>
           <a:prstGeom prst="rect">
             <a:avLst/>
@@ -5131,8 +5131,8 @@
         </p:nvSpPr>
         <p:spPr>
           <a:xfrm>
-            <a:off x="1373533" y="6519847"/>
-            <a:ext cx="291340" cy="317503"/>
+            <a:off x="1373533" y="6519846"/>
+            <a:ext cx="291341" cy="317504"/>
           </a:xfrm>
           <a:prstGeom prst="rect">
             <a:avLst/>
@@ -5175,7 +5175,7 @@
         </p:nvSpPr>
         <p:spPr>
           <a:xfrm>
-            <a:off x="1855486" y="6087624"/>
+            <a:off x="1855485" y="6087624"/>
             <a:ext cx="1378547" cy="342901"/>
           </a:xfrm>
           <a:prstGeom prst="rect">
@@ -5219,7 +5219,7 @@
         </p:nvSpPr>
         <p:spPr>
           <a:xfrm>
-            <a:off x="1855486" y="6519847"/>
+            <a:off x="1855485" y="6519847"/>
             <a:ext cx="566044" cy="342901"/>
           </a:xfrm>
           <a:prstGeom prst="rect">
@@ -5263,8 +5263,8 @@
         </p:nvSpPr>
         <p:spPr>
           <a:xfrm>
-            <a:off x="2805688" y="1749820"/>
-            <a:ext cx="2155599" cy="342901"/>
+            <a:off x="2805688" y="1749819"/>
+            <a:ext cx="2155600" cy="342901"/>
           </a:xfrm>
           <a:prstGeom prst="rect">
             <a:avLst/>
@@ -5290,7 +5290,7 @@
           <a:p>
             <a:pPr/>
             <a:r>
-              <a:t>(Old API)</a:t>
+              <a:t>(ARM API)</a:t>
             </a:r>
           </a:p>
         </p:txBody>
@@ -5304,7 +5304,7 @@
         <p:spPr>
           <a:xfrm>
             <a:off x="5731228" y="1737165"/>
-            <a:ext cx="2587841" cy="342901"/>
+            <a:ext cx="2587842" cy="342901"/>
           </a:xfrm>
           <a:prstGeom prst="rect">
             <a:avLst/>
@@ -5343,8 +5343,8 @@
         </p:nvSpPr>
         <p:spPr>
           <a:xfrm>
-            <a:off x="5208479" y="3827318"/>
-            <a:ext cx="2587842" cy="342901"/>
+            <a:off x="5208478" y="3827317"/>
+            <a:ext cx="2587843" cy="342901"/>
           </a:xfrm>
           <a:prstGeom prst="rect">
             <a:avLst/>
@@ -5383,8 +5383,8 @@
         </p:nvSpPr>
         <p:spPr>
           <a:xfrm>
-            <a:off x="10166884" y="1749820"/>
-            <a:ext cx="2587841" cy="342901"/>
+            <a:off x="10166884" y="1749819"/>
+            <a:ext cx="2587842" cy="342901"/>
           </a:xfrm>
           <a:prstGeom prst="rect">
             <a:avLst/>
@@ -5423,8 +5423,8 @@
         </p:nvSpPr>
         <p:spPr>
           <a:xfrm>
-            <a:off x="5208479" y="6998021"/>
-            <a:ext cx="2587842" cy="342901"/>
+            <a:off x="5208478" y="6998020"/>
+            <a:ext cx="2587843" cy="342901"/>
           </a:xfrm>
           <a:prstGeom prst="rect">
             <a:avLst/>
@@ -5507,14 +5507,14 @@
     </a:clrScheme>
     <a:fontScheme name="White">
       <a:majorFont>
+        <a:latin typeface="Helvetica"/>
+        <a:ea typeface="Helvetica"/>
+        <a:cs typeface="Helvetica"/>
+      </a:majorFont>
+      <a:minorFont>
         <a:latin typeface="Helvetica Neue"/>
         <a:ea typeface="Helvetica Neue"/>
         <a:cs typeface="Helvetica Neue"/>
-      </a:majorFont>
-      <a:minorFont>
-        <a:latin typeface="Helvetica"/>
-        <a:ea typeface="Helvetica"/>
-        <a:cs typeface="Helvetica"/>
       </a:minorFont>
     </a:fontScheme>
     <a:fmtScheme name="White">
@@ -5719,9 +5719,9 @@
             </a:solidFill>
             <a:effectLst/>
             <a:uFillTx/>
-            <a:latin typeface="+mn-lt"/>
-            <a:ea typeface="+mn-ea"/>
-            <a:cs typeface="+mn-cs"/>
+            <a:latin typeface="+mj-lt"/>
+            <a:ea typeface="+mj-ea"/>
+            <a:cs typeface="+mj-cs"/>
             <a:sym typeface="Helvetica"/>
           </a:defRPr>
         </a:defPPr>
@@ -6296,9 +6296,9 @@
             </a:solidFill>
             <a:effectLst/>
             <a:uFillTx/>
-            <a:latin typeface="+mn-lt"/>
-            <a:ea typeface="+mn-ea"/>
-            <a:cs typeface="+mn-cs"/>
+            <a:latin typeface="+mj-lt"/>
+            <a:ea typeface="+mj-ea"/>
+            <a:cs typeface="+mj-cs"/>
             <a:sym typeface="Helvetica"/>
           </a:defRPr>
         </a:defPPr>
@@ -6591,14 +6591,14 @@
     </a:clrScheme>
     <a:fontScheme name="White">
       <a:majorFont>
+        <a:latin typeface="Helvetica"/>
+        <a:ea typeface="Helvetica"/>
+        <a:cs typeface="Helvetica"/>
+      </a:majorFont>
+      <a:minorFont>
         <a:latin typeface="Helvetica Neue"/>
         <a:ea typeface="Helvetica Neue"/>
         <a:cs typeface="Helvetica Neue"/>
-      </a:majorFont>
-      <a:minorFont>
-        <a:latin typeface="Helvetica"/>
-        <a:ea typeface="Helvetica"/>
-        <a:cs typeface="Helvetica"/>
       </a:minorFont>
     </a:fontScheme>
     <a:fmtScheme name="White">
@@ -6803,9 +6803,9 @@
             </a:solidFill>
             <a:effectLst/>
             <a:uFillTx/>
-            <a:latin typeface="+mn-lt"/>
-            <a:ea typeface="+mn-ea"/>
-            <a:cs typeface="+mn-cs"/>
+            <a:latin typeface="+mj-lt"/>
+            <a:ea typeface="+mj-ea"/>
+            <a:cs typeface="+mj-cs"/>
             <a:sym typeface="Helvetica"/>
           </a:defRPr>
         </a:defPPr>
@@ -7380,9 +7380,9 @@
             </a:solidFill>
             <a:effectLst/>
             <a:uFillTx/>
-            <a:latin typeface="+mn-lt"/>
-            <a:ea typeface="+mn-ea"/>
-            <a:cs typeface="+mn-cs"/>
+            <a:latin typeface="+mj-lt"/>
+            <a:ea typeface="+mj-ea"/>
+            <a:cs typeface="+mj-cs"/>
             <a:sym typeface="Helvetica"/>
           </a:defRPr>
         </a:defPPr>

</xml_diff>